<commit_message>
Detalhes da Apresentação, métodos para criar e atualizar notas no alunosRepository e h2repository || Integração Java
</commit_message>
<xml_diff>
--- a/TURING_APRESENTACAO.pptx
+++ b/TURING_APRESENTACAO.pptx
@@ -113,6 +113,11 @@
       </a:defRPr>
     </a:lvl9pPr>
   </p:defaultTextStyle>
+  <p:extLst>
+    <p:ext uri="{EFAFB233-063F-42B5-8137-9DF3F51BA10A}">
+      <p15:sldGuideLst xmlns:p15="http://schemas.microsoft.com/office/powerpoint/2012/main"/>
+    </p:ext>
+  </p:extLst>
 </p:presentation>
 </file>
 
@@ -286,7 +291,7 @@
             <a:fld id="{87DE6118-2437-4B30-8E3C-4D2BE6020583}" type="datetimeFigureOut">
               <a:rPr lang="en-US" dirty="0"/>
               <a:pPr/>
-              <a:t>3/8/2021</a:t>
+              <a:t>3/9/2021</a:t>
             </a:fld>
             <a:endParaRPr lang="en-US" dirty="0"/>
           </a:p>
@@ -612,7 +617,7 @@
           <a:p>
             <a:fld id="{87DE6118-2437-4B30-8E3C-4D2BE6020583}" type="datetimeFigureOut">
               <a:rPr lang="en-US" dirty="0"/>
-              <a:t>3/8/2021</a:t>
+              <a:t>3/9/2021</a:t>
             </a:fld>
             <a:endParaRPr lang="en-US" dirty="0"/>
           </a:p>
@@ -787,7 +792,7 @@
           <a:p>
             <a:fld id="{87DE6118-2437-4B30-8E3C-4D2BE6020583}" type="datetimeFigureOut">
               <a:rPr lang="en-US" dirty="0"/>
-              <a:t>3/8/2021</a:t>
+              <a:t>3/9/2021</a:t>
             </a:fld>
             <a:endParaRPr lang="en-US" dirty="0"/>
           </a:p>
@@ -952,7 +957,7 @@
           <a:p>
             <a:fld id="{87DE6118-2437-4B30-8E3C-4D2BE6020583}" type="datetimeFigureOut">
               <a:rPr lang="en-US" dirty="0"/>
-              <a:t>3/8/2021</a:t>
+              <a:t>3/9/2021</a:t>
             </a:fld>
             <a:endParaRPr lang="en-US" dirty="0"/>
           </a:p>
@@ -1225,7 +1230,7 @@
             <a:fld id="{87DE6118-2437-4B30-8E3C-4D2BE6020583}" type="datetimeFigureOut">
               <a:rPr lang="en-US" dirty="0"/>
               <a:pPr/>
-              <a:t>3/8/2021</a:t>
+              <a:t>3/9/2021</a:t>
             </a:fld>
             <a:endParaRPr lang="en-US" dirty="0"/>
           </a:p>
@@ -1615,7 +1620,7 @@
           <a:p>
             <a:fld id="{87DE6118-2437-4B30-8E3C-4D2BE6020583}" type="datetimeFigureOut">
               <a:rPr lang="en-US" dirty="0"/>
-              <a:t>3/8/2021</a:t>
+              <a:t>3/9/2021</a:t>
             </a:fld>
             <a:endParaRPr lang="en-US" dirty="0"/>
           </a:p>
@@ -2087,7 +2092,7 @@
           <a:p>
             <a:fld id="{87DE6118-2437-4B30-8E3C-4D2BE6020583}" type="datetimeFigureOut">
               <a:rPr lang="en-US" dirty="0"/>
-              <a:t>3/8/2021</a:t>
+              <a:t>3/9/2021</a:t>
             </a:fld>
             <a:endParaRPr lang="en-US" dirty="0"/>
           </a:p>
@@ -2200,7 +2205,7 @@
           <a:p>
             <a:fld id="{87DE6118-2437-4B30-8E3C-4D2BE6020583}" type="datetimeFigureOut">
               <a:rPr lang="en-US" dirty="0"/>
-              <a:t>3/8/2021</a:t>
+              <a:t>3/9/2021</a:t>
             </a:fld>
             <a:endParaRPr lang="en-US" dirty="0"/>
           </a:p>
@@ -2290,7 +2295,7 @@
           <a:p>
             <a:fld id="{87DE6118-2437-4B30-8E3C-4D2BE6020583}" type="datetimeFigureOut">
               <a:rPr lang="en-US" dirty="0"/>
-              <a:t>3/8/2021</a:t>
+              <a:t>3/9/2021</a:t>
             </a:fld>
             <a:endParaRPr lang="en-US" dirty="0"/>
           </a:p>
@@ -2632,7 +2637,7 @@
             <a:fld id="{87DE6118-2437-4B30-8E3C-4D2BE6020583}" type="datetimeFigureOut">
               <a:rPr lang="en-US" dirty="0"/>
               <a:pPr/>
-              <a:t>3/8/2021</a:t>
+              <a:t>3/9/2021</a:t>
             </a:fld>
             <a:endParaRPr lang="en-US" dirty="0"/>
           </a:p>
@@ -3017,7 +3022,7 @@
             <a:fld id="{87DE6118-2437-4B30-8E3C-4D2BE6020583}" type="datetimeFigureOut">
               <a:rPr lang="en-US" dirty="0"/>
               <a:pPr/>
-              <a:t>3/8/2021</a:t>
+              <a:t>3/9/2021</a:t>
             </a:fld>
             <a:endParaRPr lang="en-US" dirty="0"/>
           </a:p>
@@ -3292,7 +3297,7 @@
             <a:fld id="{87DE6118-2437-4B30-8E3C-4D2BE6020583}" type="datetimeFigureOut">
               <a:rPr lang="en-US" dirty="0"/>
               <a:pPr/>
-              <a:t>3/8/2021</a:t>
+              <a:t>3/9/2021</a:t>
             </a:fld>
             <a:endParaRPr lang="en-US" dirty="0"/>
           </a:p>
@@ -3910,7 +3915,54 @@
           <a:bodyPr/>
           <a:lstStyle/>
           <a:p>
-            <a:endParaRPr lang="pt-BR"/>
+            <a:r>
+              <a:rPr lang="pt-BR" dirty="0" smtClean="0"/>
+              <a:t>Gama </a:t>
+            </a:r>
+            <a:r>
+              <a:rPr lang="pt-BR" dirty="0" err="1" smtClean="0"/>
+              <a:t>Academu</a:t>
+            </a:r>
+            <a:endParaRPr lang="pt-BR" dirty="0" smtClean="0"/>
+          </a:p>
+          <a:p>
+            <a:r>
+              <a:rPr lang="pt-BR" dirty="0" smtClean="0"/>
+              <a:t>Accenture</a:t>
+            </a:r>
+          </a:p>
+          <a:p>
+            <a:r>
+              <a:rPr lang="pt-BR" dirty="0" smtClean="0"/>
+              <a:t>Professor Java</a:t>
+            </a:r>
+          </a:p>
+          <a:p>
+            <a:r>
+              <a:rPr lang="pt-BR" dirty="0" smtClean="0"/>
+              <a:t>Professor Node</a:t>
+            </a:r>
+          </a:p>
+          <a:p>
+            <a:r>
+              <a:rPr lang="pt-BR" dirty="0" smtClean="0"/>
+              <a:t>Bruce</a:t>
+            </a:r>
+          </a:p>
+          <a:p>
+            <a:r>
+              <a:rPr lang="pt-BR" dirty="0" smtClean="0"/>
+              <a:t>Camila</a:t>
+            </a:r>
+          </a:p>
+          <a:p>
+            <a:r>
+              <a:rPr lang="pt-BR" dirty="0" smtClean="0"/>
+              <a:t>Café</a:t>
+            </a:r>
+          </a:p>
+          <a:p>
+            <a:endParaRPr lang="pt-BR" dirty="0"/>
           </a:p>
         </p:txBody>
       </p:sp>

</xml_diff>

<commit_message>
PPT, controllers, confiResolver, repositories, routes
</commit_message>
<xml_diff>
--- a/TURING_APRESENTACAO.pptx
+++ b/TURING_APRESENTACAO.pptx
@@ -10,11 +10,12 @@
     <p:sldId id="258" r:id="rId4"/>
     <p:sldId id="262" r:id="rId5"/>
     <p:sldId id="259" r:id="rId6"/>
-    <p:sldId id="263" r:id="rId7"/>
-    <p:sldId id="264" r:id="rId8"/>
-    <p:sldId id="265" r:id="rId9"/>
-    <p:sldId id="261" r:id="rId10"/>
-    <p:sldId id="260" r:id="rId11"/>
+    <p:sldId id="266" r:id="rId7"/>
+    <p:sldId id="263" r:id="rId8"/>
+    <p:sldId id="267" r:id="rId9"/>
+    <p:sldId id="264" r:id="rId10"/>
+    <p:sldId id="268" r:id="rId11"/>
+    <p:sldId id="260" r:id="rId12"/>
   </p:sldIdLst>
   <p:sldSz cx="12192000" cy="6858000"/>
   <p:notesSz cx="6858000" cy="9144000"/>
@@ -291,7 +292,7 @@
             <a:fld id="{87DE6118-2437-4B30-8E3C-4D2BE6020583}" type="datetimeFigureOut">
               <a:rPr lang="en-US" dirty="0"/>
               <a:pPr/>
-              <a:t>3/9/2021</a:t>
+              <a:t>3/10/2021</a:t>
             </a:fld>
             <a:endParaRPr lang="en-US" dirty="0"/>
           </a:p>
@@ -617,7 +618,7 @@
           <a:p>
             <a:fld id="{87DE6118-2437-4B30-8E3C-4D2BE6020583}" type="datetimeFigureOut">
               <a:rPr lang="en-US" dirty="0"/>
-              <a:t>3/9/2021</a:t>
+              <a:t>3/10/2021</a:t>
             </a:fld>
             <a:endParaRPr lang="en-US" dirty="0"/>
           </a:p>
@@ -792,7 +793,7 @@
           <a:p>
             <a:fld id="{87DE6118-2437-4B30-8E3C-4D2BE6020583}" type="datetimeFigureOut">
               <a:rPr lang="en-US" dirty="0"/>
-              <a:t>3/9/2021</a:t>
+              <a:t>3/10/2021</a:t>
             </a:fld>
             <a:endParaRPr lang="en-US" dirty="0"/>
           </a:p>
@@ -957,7 +958,7 @@
           <a:p>
             <a:fld id="{87DE6118-2437-4B30-8E3C-4D2BE6020583}" type="datetimeFigureOut">
               <a:rPr lang="en-US" dirty="0"/>
-              <a:t>3/9/2021</a:t>
+              <a:t>3/10/2021</a:t>
             </a:fld>
             <a:endParaRPr lang="en-US" dirty="0"/>
           </a:p>
@@ -1230,7 +1231,7 @@
             <a:fld id="{87DE6118-2437-4B30-8E3C-4D2BE6020583}" type="datetimeFigureOut">
               <a:rPr lang="en-US" dirty="0"/>
               <a:pPr/>
-              <a:t>3/9/2021</a:t>
+              <a:t>3/10/2021</a:t>
             </a:fld>
             <a:endParaRPr lang="en-US" dirty="0"/>
           </a:p>
@@ -1620,7 +1621,7 @@
           <a:p>
             <a:fld id="{87DE6118-2437-4B30-8E3C-4D2BE6020583}" type="datetimeFigureOut">
               <a:rPr lang="en-US" dirty="0"/>
-              <a:t>3/9/2021</a:t>
+              <a:t>3/10/2021</a:t>
             </a:fld>
             <a:endParaRPr lang="en-US" dirty="0"/>
           </a:p>
@@ -2092,7 +2093,7 @@
           <a:p>
             <a:fld id="{87DE6118-2437-4B30-8E3C-4D2BE6020583}" type="datetimeFigureOut">
               <a:rPr lang="en-US" dirty="0"/>
-              <a:t>3/9/2021</a:t>
+              <a:t>3/10/2021</a:t>
             </a:fld>
             <a:endParaRPr lang="en-US" dirty="0"/>
           </a:p>
@@ -2205,7 +2206,7 @@
           <a:p>
             <a:fld id="{87DE6118-2437-4B30-8E3C-4D2BE6020583}" type="datetimeFigureOut">
               <a:rPr lang="en-US" dirty="0"/>
-              <a:t>3/9/2021</a:t>
+              <a:t>3/10/2021</a:t>
             </a:fld>
             <a:endParaRPr lang="en-US" dirty="0"/>
           </a:p>
@@ -2295,7 +2296,7 @@
           <a:p>
             <a:fld id="{87DE6118-2437-4B30-8E3C-4D2BE6020583}" type="datetimeFigureOut">
               <a:rPr lang="en-US" dirty="0"/>
-              <a:t>3/9/2021</a:t>
+              <a:t>3/10/2021</a:t>
             </a:fld>
             <a:endParaRPr lang="en-US" dirty="0"/>
           </a:p>
@@ -2637,7 +2638,7 @@
             <a:fld id="{87DE6118-2437-4B30-8E3C-4D2BE6020583}" type="datetimeFigureOut">
               <a:rPr lang="en-US" dirty="0"/>
               <a:pPr/>
-              <a:t>3/9/2021</a:t>
+              <a:t>3/10/2021</a:t>
             </a:fld>
             <a:endParaRPr lang="en-US" dirty="0"/>
           </a:p>
@@ -3022,7 +3023,7 @@
             <a:fld id="{87DE6118-2437-4B30-8E3C-4D2BE6020583}" type="datetimeFigureOut">
               <a:rPr lang="en-US" dirty="0"/>
               <a:pPr/>
-              <a:t>3/9/2021</a:t>
+              <a:t>3/10/2021</a:t>
             </a:fld>
             <a:endParaRPr lang="en-US" dirty="0"/>
           </a:p>
@@ -3297,7 +3298,7 @@
             <a:fld id="{87DE6118-2437-4B30-8E3C-4D2BE6020583}" type="datetimeFigureOut">
               <a:rPr lang="en-US" dirty="0"/>
               <a:pPr/>
-              <a:t>3/9/2021</a:t>
+              <a:t>3/10/2021</a:t>
             </a:fld>
             <a:endParaRPr lang="en-US" dirty="0"/>
           </a:p>
@@ -3805,45 +3806,86 @@
           <a:chExt cx="0" cy="0"/>
         </a:xfrm>
       </p:grpSpPr>
-      <p:sp>
-        <p:nvSpPr>
-          <p:cNvPr id="2" name="Título 1"/>
-          <p:cNvSpPr>
-            <a:spLocks noGrp="1"/>
-          </p:cNvSpPr>
-          <p:nvPr>
-            <p:ph type="ctrTitle"/>
-          </p:nvPr>
-        </p:nvSpPr>
-        <p:spPr/>
-        <p:txBody>
-          <a:bodyPr/>
-          <a:lstStyle/>
-          <a:p>
-            <a:r>
-              <a:rPr lang="pt-BR" b="1" dirty="0" smtClean="0"/>
+      <p:pic>
+        <p:nvPicPr>
+          <p:cNvPr id="5" name="Imagem 4"/>
+          <p:cNvPicPr>
+            <a:picLocks noChangeAspect="1"/>
+          </p:cNvPicPr>
+          <p:nvPr/>
+        </p:nvPicPr>
+        <p:blipFill>
+          <a:blip r:embed="rId2">
+            <a:extLst>
+              <a:ext uri="{28A0092B-C50C-407E-A947-70E740481C1C}">
+                <a14:useLocalDpi xmlns:a14="http://schemas.microsoft.com/office/drawing/2010/main" val="0"/>
+              </a:ext>
+            </a:extLst>
+          </a:blip>
+          <a:stretch>
+            <a:fillRect/>
+          </a:stretch>
+        </p:blipFill>
+        <p:spPr>
+          <a:xfrm>
+            <a:off x="8419612" y="3185771"/>
+            <a:ext cx="1856745" cy="1856745"/>
+          </a:xfrm>
+          <a:prstGeom prst="rect">
+            <a:avLst/>
+          </a:prstGeom>
+          <a:effectLst>
+            <a:softEdge rad="63500"/>
+          </a:effectLst>
+        </p:spPr>
+      </p:pic>
+      <p:sp>
+        <p:nvSpPr>
+          <p:cNvPr id="7" name="Título 1"/>
+          <p:cNvSpPr txBox="1">
+            <a:spLocks/>
+          </p:cNvSpPr>
+          <p:nvPr/>
+        </p:nvSpPr>
+        <p:spPr>
+          <a:xfrm>
+            <a:off x="2679905" y="1788453"/>
+            <a:ext cx="5531033" cy="2578273"/>
+          </a:xfrm>
+          <a:prstGeom prst="rect">
+            <a:avLst/>
+          </a:prstGeom>
+        </p:spPr>
+        <p:txBody>
+          <a:bodyPr vert="horz" lIns="91440" tIns="45720" rIns="91440" bIns="45720" rtlCol="0" anchor="b">
+            <a:noAutofit/>
+          </a:bodyPr>
+          <a:lstStyle>
+            <a:lvl1pPr algn="ctr" defTabSz="914400" rtl="0" eaLnBrk="1" latinLnBrk="0" hangingPunct="1">
+              <a:lnSpc>
+                <a:spcPct val="89000"/>
+              </a:lnSpc>
+              <a:spcBef>
+                <a:spcPct val="0"/>
+              </a:spcBef>
+              <a:buNone/>
+              <a:defRPr sz="7200" kern="1200" cap="all" baseline="0">
+                <a:solidFill>
+                  <a:schemeClr val="tx2"/>
+                </a:solidFill>
+                <a:latin typeface="+mj-lt"/>
+                <a:ea typeface="+mj-ea"/>
+                <a:cs typeface="+mj-cs"/>
+              </a:defRPr>
+            </a:lvl1pPr>
+          </a:lstStyle>
+          <a:p>
+            <a:pPr algn="l"/>
+            <a:r>
+              <a:rPr lang="pt-BR" sz="11500" b="1" dirty="0" smtClean="0"/>
               <a:t>TURING</a:t>
             </a:r>
-            <a:endParaRPr lang="pt-BR" b="1" dirty="0"/>
-          </a:p>
-        </p:txBody>
-      </p:sp>
-      <p:sp>
-        <p:nvSpPr>
-          <p:cNvPr id="3" name="Subtítulo 2"/>
-          <p:cNvSpPr>
-            <a:spLocks noGrp="1"/>
-          </p:cNvSpPr>
-          <p:nvPr>
-            <p:ph type="subTitle" idx="1"/>
-          </p:nvPr>
-        </p:nvSpPr>
-        <p:spPr/>
-        <p:txBody>
-          <a:bodyPr/>
-          <a:lstStyle/>
-          <a:p>
-            <a:endParaRPr lang="pt-BR"/>
+            <a:endParaRPr lang="pt-BR" sz="8800" b="1" dirty="0"/>
           </a:p>
         </p:txBody>
       </p:sp>
@@ -3892,6 +3934,74 @@
           <a:bodyPr/>
           <a:lstStyle/>
           <a:p>
+            <a:endParaRPr lang="pt-BR"/>
+          </a:p>
+        </p:txBody>
+      </p:sp>
+      <p:sp>
+        <p:nvSpPr>
+          <p:cNvPr id="3" name="Espaço Reservado para Conteúdo 2"/>
+          <p:cNvSpPr>
+            <a:spLocks noGrp="1"/>
+          </p:cNvSpPr>
+          <p:nvPr>
+            <p:ph idx="1"/>
+          </p:nvPr>
+        </p:nvSpPr>
+        <p:spPr/>
+        <p:txBody>
+          <a:bodyPr/>
+          <a:lstStyle/>
+          <a:p>
+            <a:endParaRPr lang="pt-BR"/>
+          </a:p>
+        </p:txBody>
+      </p:sp>
+    </p:spTree>
+    <p:extLst>
+      <p:ext uri="{BB962C8B-B14F-4D97-AF65-F5344CB8AC3E}">
+        <p14:creationId xmlns:p14="http://schemas.microsoft.com/office/powerpoint/2010/main" val="4118473218"/>
+      </p:ext>
+    </p:extLst>
+  </p:cSld>
+  <p:clrMapOvr>
+    <a:masterClrMapping/>
+  </p:clrMapOvr>
+</p:sld>
+</file>
+
+<file path=ppt/slides/slide11.xml><?xml version="1.0" encoding="utf-8"?>
+<p:sld xmlns:a="http://schemas.openxmlformats.org/drawingml/2006/main" xmlns:r="http://schemas.openxmlformats.org/officeDocument/2006/relationships" xmlns:p="http://schemas.openxmlformats.org/presentationml/2006/main">
+  <p:cSld>
+    <p:spTree>
+      <p:nvGrpSpPr>
+        <p:cNvPr id="1" name=""/>
+        <p:cNvGrpSpPr/>
+        <p:nvPr/>
+      </p:nvGrpSpPr>
+      <p:grpSpPr>
+        <a:xfrm>
+          <a:off x="0" y="0"/>
+          <a:ext cx="0" cy="0"/>
+          <a:chOff x="0" y="0"/>
+          <a:chExt cx="0" cy="0"/>
+        </a:xfrm>
+      </p:grpSpPr>
+      <p:sp>
+        <p:nvSpPr>
+          <p:cNvPr id="2" name="Título 1"/>
+          <p:cNvSpPr>
+            <a:spLocks noGrp="1"/>
+          </p:cNvSpPr>
+          <p:nvPr>
+            <p:ph type="title"/>
+          </p:nvPr>
+        </p:nvSpPr>
+        <p:spPr/>
+        <p:txBody>
+          <a:bodyPr/>
+          <a:lstStyle/>
+          <a:p>
             <a:r>
               <a:rPr lang="pt-BR" b="1" dirty="0" smtClean="0"/>
               <a:t>AGRADECIMENTOS</a:t>
@@ -3921,7 +4031,7 @@
             </a:r>
             <a:r>
               <a:rPr lang="pt-BR" dirty="0" err="1" smtClean="0"/>
-              <a:t>Academu</a:t>
+              <a:t>Academy</a:t>
             </a:r>
             <a:endParaRPr lang="pt-BR" dirty="0" smtClean="0"/>
           </a:p>
@@ -3934,13 +4044,13 @@
           <a:p>
             <a:r>
               <a:rPr lang="pt-BR" dirty="0" smtClean="0"/>
-              <a:t>Professor Java</a:t>
+              <a:t>Professor Marcus (Java)</a:t>
             </a:r>
           </a:p>
           <a:p>
             <a:r>
               <a:rPr lang="pt-BR" dirty="0" smtClean="0"/>
-              <a:t>Professor Node</a:t>
+              <a:t>Professor Gustavo (Node)</a:t>
             </a:r>
           </a:p>
           <a:p>
@@ -3966,6 +4076,126 @@
           </a:p>
         </p:txBody>
       </p:sp>
+      <p:pic>
+        <p:nvPicPr>
+          <p:cNvPr id="4" name="Imagem 3"/>
+          <p:cNvPicPr>
+            <a:picLocks noChangeAspect="1"/>
+          </p:cNvPicPr>
+          <p:nvPr/>
+        </p:nvPicPr>
+        <p:blipFill>
+          <a:blip r:embed="rId2">
+            <a:extLst>
+              <a:ext uri="{28A0092B-C50C-407E-A947-70E740481C1C}">
+                <a14:useLocalDpi xmlns:a14="http://schemas.microsoft.com/office/drawing/2010/main" val="0"/>
+              </a:ext>
+            </a:extLst>
+          </a:blip>
+          <a:stretch>
+            <a:fillRect/>
+          </a:stretch>
+        </p:blipFill>
+        <p:spPr>
+          <a:xfrm>
+            <a:off x="8156121" y="1670957"/>
+            <a:ext cx="2816679" cy="1577340"/>
+          </a:xfrm>
+          <a:prstGeom prst="rect">
+            <a:avLst/>
+          </a:prstGeom>
+        </p:spPr>
+      </p:pic>
+      <p:pic>
+        <p:nvPicPr>
+          <p:cNvPr id="5" name="Imagem 4"/>
+          <p:cNvPicPr>
+            <a:picLocks noChangeAspect="1"/>
+          </p:cNvPicPr>
+          <p:nvPr/>
+        </p:nvPicPr>
+        <p:blipFill>
+          <a:blip r:embed="rId3">
+            <a:extLst>
+              <a:ext uri="{28A0092B-C50C-407E-A947-70E740481C1C}">
+                <a14:useLocalDpi xmlns:a14="http://schemas.microsoft.com/office/drawing/2010/main" val="0"/>
+              </a:ext>
+            </a:extLst>
+          </a:blip>
+          <a:stretch>
+            <a:fillRect/>
+          </a:stretch>
+        </p:blipFill>
+        <p:spPr>
+          <a:xfrm>
+            <a:off x="7648575" y="3719736"/>
+            <a:ext cx="3324225" cy="1381125"/>
+          </a:xfrm>
+          <a:prstGeom prst="rect">
+            <a:avLst/>
+          </a:prstGeom>
+        </p:spPr>
+      </p:pic>
+      <p:pic>
+        <p:nvPicPr>
+          <p:cNvPr id="6" name="Imagem 5"/>
+          <p:cNvPicPr>
+            <a:picLocks noChangeAspect="1"/>
+          </p:cNvPicPr>
+          <p:nvPr/>
+        </p:nvPicPr>
+        <p:blipFill>
+          <a:blip r:embed="rId4">
+            <a:extLst>
+              <a:ext uri="{28A0092B-C50C-407E-A947-70E740481C1C}">
+                <a14:useLocalDpi xmlns:a14="http://schemas.microsoft.com/office/drawing/2010/main" val="0"/>
+              </a:ext>
+            </a:extLst>
+          </a:blip>
+          <a:stretch>
+            <a:fillRect/>
+          </a:stretch>
+        </p:blipFill>
+        <p:spPr>
+          <a:xfrm>
+            <a:off x="5595878" y="2286000"/>
+            <a:ext cx="2560243" cy="1433736"/>
+          </a:xfrm>
+          <a:prstGeom prst="rect">
+            <a:avLst/>
+          </a:prstGeom>
+        </p:spPr>
+      </p:pic>
+      <p:pic>
+        <p:nvPicPr>
+          <p:cNvPr id="7" name="Imagem 6"/>
+          <p:cNvPicPr>
+            <a:picLocks noChangeAspect="1"/>
+          </p:cNvPicPr>
+          <p:nvPr/>
+        </p:nvPicPr>
+        <p:blipFill>
+          <a:blip r:embed="rId5">
+            <a:extLst>
+              <a:ext uri="{28A0092B-C50C-407E-A947-70E740481C1C}">
+                <a14:useLocalDpi xmlns:a14="http://schemas.microsoft.com/office/drawing/2010/main" val="0"/>
+              </a:ext>
+            </a:extLst>
+          </a:blip>
+          <a:stretch>
+            <a:fillRect/>
+          </a:stretch>
+        </p:blipFill>
+        <p:spPr>
+          <a:xfrm>
+            <a:off x="5595878" y="4833257"/>
+            <a:ext cx="2742728" cy="1034143"/>
+          </a:xfrm>
+          <a:prstGeom prst="rect">
+            <a:avLst/>
+          </a:prstGeom>
+        </p:spPr>
+      </p:pic>
     </p:spTree>
     <p:extLst>
       <p:ext uri="{BB962C8B-B14F-4D97-AF65-F5344CB8AC3E}">
@@ -4047,6 +4277,9 @@
           <a:prstGeom prst="rect">
             <a:avLst/>
           </a:prstGeom>
+          <a:effectLst>
+            <a:softEdge rad="63500"/>
+          </a:effectLst>
         </p:spPr>
       </p:pic>
       <p:sp>
@@ -4116,6 +4349,9 @@
           <a:prstGeom prst="rect">
             <a:avLst/>
           </a:prstGeom>
+          <a:effectLst>
+            <a:softEdge rad="63500"/>
+          </a:effectLst>
         </p:spPr>
       </p:pic>
       <p:pic>
@@ -4146,6 +4382,9 @@
           <a:prstGeom prst="rect">
             <a:avLst/>
           </a:prstGeom>
+          <a:effectLst>
+            <a:softEdge rad="63500"/>
+          </a:effectLst>
         </p:spPr>
       </p:pic>
       <p:sp>
@@ -4863,36 +5102,15 @@
           <a:chExt cx="0" cy="0"/>
         </a:xfrm>
       </p:grpSpPr>
-      <p:sp>
-        <p:nvSpPr>
-          <p:cNvPr id="2" name="Título 1"/>
-          <p:cNvSpPr>
-            <a:spLocks noGrp="1"/>
-          </p:cNvSpPr>
-          <p:nvPr>
-            <p:ph type="title"/>
-          </p:nvPr>
-        </p:nvSpPr>
-        <p:spPr/>
-        <p:txBody>
-          <a:bodyPr/>
-          <a:lstStyle/>
-          <a:p>
-            <a:r>
-              <a:rPr lang="pt-BR" b="1" dirty="0" smtClean="0"/>
-              <a:t>PROJETO NODE</a:t>
-            </a:r>
-            <a:endParaRPr lang="pt-BR" b="1" dirty="0"/>
-          </a:p>
-        </p:txBody>
-      </p:sp>
       <p:pic>
         <p:nvPicPr>
-          <p:cNvPr id="14" name="Imagem 13"/>
+          <p:cNvPr id="4" name="Espaço Reservado para Conteúdo 3"/>
           <p:cNvPicPr>
-            <a:picLocks noChangeAspect="1"/>
+            <a:picLocks noGrp="1" noChangeAspect="1"/>
           </p:cNvPicPr>
-          <p:nvPr/>
+          <p:nvPr>
+            <p:ph idx="1"/>
+          </p:nvPr>
         </p:nvPicPr>
         <p:blipFill>
           <a:blip r:embed="rId2">
@@ -4908,18 +5126,44 @@
         </p:blipFill>
         <p:spPr>
           <a:xfrm>
-            <a:off x="1741606" y="2694127"/>
-            <a:ext cx="9231194" cy="3480613"/>
-          </a:xfrm>
-          <a:prstGeom prst="rect">
-            <a:avLst/>
-          </a:prstGeom>
+            <a:off x="1371600" y="774065"/>
+            <a:ext cx="9601200" cy="5400675"/>
+          </a:xfrm>
         </p:spPr>
       </p:pic>
+      <p:sp>
+        <p:nvSpPr>
+          <p:cNvPr id="2" name="Título 1"/>
+          <p:cNvSpPr>
+            <a:spLocks noGrp="1"/>
+          </p:cNvSpPr>
+          <p:nvPr>
+            <p:ph type="title"/>
+          </p:nvPr>
+        </p:nvSpPr>
+        <p:spPr>
+          <a:xfrm>
+            <a:off x="1371600" y="799014"/>
+            <a:ext cx="9601200" cy="724989"/>
+          </a:xfrm>
+        </p:spPr>
+        <p:txBody>
+          <a:bodyPr/>
+          <a:lstStyle/>
+          <a:p>
+            <a:pPr algn="ctr"/>
+            <a:r>
+              <a:rPr lang="pt-BR" b="1" dirty="0" smtClean="0"/>
+              <a:t>FLUXO DE DADOS</a:t>
+            </a:r>
+            <a:endParaRPr lang="pt-BR" b="1" dirty="0"/>
+          </a:p>
+        </p:txBody>
+      </p:sp>
     </p:spTree>
     <p:extLst>
       <p:ext uri="{BB962C8B-B14F-4D97-AF65-F5344CB8AC3E}">
-        <p14:creationId xmlns:p14="http://schemas.microsoft.com/office/powerpoint/2010/main" val="2231189063"/>
+        <p14:creationId xmlns:p14="http://schemas.microsoft.com/office/powerpoint/2010/main" val="3372026258"/>
       </p:ext>
     </p:extLst>
   </p:cSld>
@@ -4963,7 +5207,7 @@
           <a:p>
             <a:r>
               <a:rPr lang="pt-BR" b="1" dirty="0" smtClean="0"/>
-              <a:t>PROJETO INTEGRADO</a:t>
+              <a:t>PROJETO NODE</a:t>
             </a:r>
             <a:endParaRPr lang="pt-BR" b="1" dirty="0"/>
           </a:p>
@@ -4971,7 +5215,7 @@
       </p:sp>
       <p:pic>
         <p:nvPicPr>
-          <p:cNvPr id="13" name="Imagem 12"/>
+          <p:cNvPr id="14" name="Imagem 13"/>
           <p:cNvPicPr>
             <a:picLocks noChangeAspect="1"/>
           </p:cNvPicPr>
@@ -4991,38 +5235,8 @@
         </p:blipFill>
         <p:spPr>
           <a:xfrm>
-            <a:off x="1371600" y="2171700"/>
-            <a:ext cx="4081780" cy="2285797"/>
-          </a:xfrm>
-          <a:prstGeom prst="rect">
-            <a:avLst/>
-          </a:prstGeom>
-        </p:spPr>
-      </p:pic>
-      <p:pic>
-        <p:nvPicPr>
-          <p:cNvPr id="14" name="Imagem 13"/>
-          <p:cNvPicPr>
-            <a:picLocks noChangeAspect="1"/>
-          </p:cNvPicPr>
-          <p:nvPr/>
-        </p:nvPicPr>
-        <p:blipFill>
-          <a:blip r:embed="rId3">
-            <a:extLst>
-              <a:ext uri="{28A0092B-C50C-407E-A947-70E740481C1C}">
-                <a14:useLocalDpi xmlns:a14="http://schemas.microsoft.com/office/drawing/2010/main" val="0"/>
-              </a:ext>
-            </a:extLst>
-          </a:blip>
-          <a:stretch>
-            <a:fillRect/>
-          </a:stretch>
-        </p:blipFill>
-        <p:spPr>
-          <a:xfrm>
-            <a:off x="6156960" y="2406694"/>
-            <a:ext cx="4815840" cy="1815808"/>
+            <a:off x="1741606" y="2694127"/>
+            <a:ext cx="9231194" cy="3480613"/>
           </a:xfrm>
           <a:prstGeom prst="rect">
             <a:avLst/>
@@ -5032,7 +5246,7 @@
     </p:spTree>
     <p:extLst>
       <p:ext uri="{BB962C8B-B14F-4D97-AF65-F5344CB8AC3E}">
-        <p14:creationId xmlns:p14="http://schemas.microsoft.com/office/powerpoint/2010/main" val="4122009148"/>
+        <p14:creationId xmlns:p14="http://schemas.microsoft.com/office/powerpoint/2010/main" val="2231189063"/>
       </p:ext>
     </p:extLst>
   </p:cSld>
@@ -5074,78 +5288,33 @@
           <a:bodyPr/>
           <a:lstStyle/>
           <a:p>
-            <a:r>
-              <a:rPr lang="pt-BR" b="1" dirty="0" smtClean="0"/>
-              <a:t>PROJETO INTEGRADO</a:t>
-            </a:r>
-            <a:endParaRPr lang="pt-BR" b="1" dirty="0"/>
-          </a:p>
-        </p:txBody>
-      </p:sp>
-      <p:pic>
-        <p:nvPicPr>
-          <p:cNvPr id="13" name="Imagem 12"/>
-          <p:cNvPicPr>
-            <a:picLocks noChangeAspect="1"/>
-          </p:cNvPicPr>
-          <p:nvPr/>
-        </p:nvPicPr>
-        <p:blipFill>
-          <a:blip r:embed="rId2">
-            <a:extLst>
-              <a:ext uri="{28A0092B-C50C-407E-A947-70E740481C1C}">
-                <a14:useLocalDpi xmlns:a14="http://schemas.microsoft.com/office/drawing/2010/main" val="0"/>
-              </a:ext>
-            </a:extLst>
-          </a:blip>
-          <a:stretch>
-            <a:fillRect/>
-          </a:stretch>
-        </p:blipFill>
-        <p:spPr>
-          <a:xfrm>
-            <a:off x="1374140" y="3888943"/>
-            <a:ext cx="4081780" cy="2285797"/>
-          </a:xfrm>
-          <a:prstGeom prst="rect">
-            <a:avLst/>
-          </a:prstGeom>
-        </p:spPr>
-      </p:pic>
-      <p:pic>
-        <p:nvPicPr>
-          <p:cNvPr id="14" name="Imagem 13"/>
-          <p:cNvPicPr>
-            <a:picLocks noChangeAspect="1"/>
-          </p:cNvPicPr>
-          <p:nvPr/>
-        </p:nvPicPr>
-        <p:blipFill>
-          <a:blip r:embed="rId3">
-            <a:extLst>
-              <a:ext uri="{28A0092B-C50C-407E-A947-70E740481C1C}">
-                <a14:useLocalDpi xmlns:a14="http://schemas.microsoft.com/office/drawing/2010/main" val="0"/>
-              </a:ext>
-            </a:extLst>
-          </a:blip>
-          <a:stretch>
-            <a:fillRect/>
-          </a:stretch>
-        </p:blipFill>
-        <p:spPr>
-          <a:xfrm>
-            <a:off x="6156960" y="4358932"/>
-            <a:ext cx="4815840" cy="1815808"/>
-          </a:xfrm>
-          <a:prstGeom prst="rect">
-            <a:avLst/>
-          </a:prstGeom>
-        </p:spPr>
-      </p:pic>
+            <a:endParaRPr lang="pt-BR"/>
+          </a:p>
+        </p:txBody>
+      </p:sp>
+      <p:sp>
+        <p:nvSpPr>
+          <p:cNvPr id="3" name="Espaço Reservado para Conteúdo 2"/>
+          <p:cNvSpPr>
+            <a:spLocks noGrp="1"/>
+          </p:cNvSpPr>
+          <p:nvPr>
+            <p:ph idx="1"/>
+          </p:nvPr>
+        </p:nvSpPr>
+        <p:spPr/>
+        <p:txBody>
+          <a:bodyPr/>
+          <a:lstStyle/>
+          <a:p>
+            <a:endParaRPr lang="pt-BR"/>
+          </a:p>
+        </p:txBody>
+      </p:sp>
     </p:spTree>
     <p:extLst>
       <p:ext uri="{BB962C8B-B14F-4D97-AF65-F5344CB8AC3E}">
-        <p14:creationId xmlns:p14="http://schemas.microsoft.com/office/powerpoint/2010/main" val="3514735715"/>
+        <p14:creationId xmlns:p14="http://schemas.microsoft.com/office/powerpoint/2010/main" val="3839719402"/>
       </p:ext>
     </p:extLst>
   </p:cSld>
@@ -5189,7 +5358,7 @@
           <a:p>
             <a:r>
               <a:rPr lang="pt-BR" b="1" dirty="0" smtClean="0"/>
-              <a:t>MODELAGEM DO BANCO DE DADOS</a:t>
+              <a:t>PROJETO INTEGRADO</a:t>
             </a:r>
             <a:endParaRPr lang="pt-BR" b="1" dirty="0"/>
           </a:p>
@@ -5197,13 +5366,11 @@
       </p:sp>
       <p:pic>
         <p:nvPicPr>
-          <p:cNvPr id="6" name="Espaço Reservado para Conteúdo 5"/>
+          <p:cNvPr id="13" name="Imagem 12"/>
           <p:cNvPicPr>
-            <a:picLocks noGrp="1" noChangeAspect="1"/>
+            <a:picLocks noChangeAspect="1"/>
           </p:cNvPicPr>
-          <p:nvPr>
-            <p:ph idx="1"/>
-          </p:nvPr>
+          <p:nvPr/>
         </p:nvPicPr>
         <p:blipFill>
           <a:blip r:embed="rId2">
@@ -5219,15 +5386,48 @@
         </p:blipFill>
         <p:spPr>
           <a:xfrm>
-            <a:off x="1371600" y="2593340"/>
-            <a:ext cx="5453495" cy="3581400"/>
-          </a:xfrm>
+            <a:off x="1371600" y="2171700"/>
+            <a:ext cx="4081780" cy="2285797"/>
+          </a:xfrm>
+          <a:prstGeom prst="rect">
+            <a:avLst/>
+          </a:prstGeom>
+        </p:spPr>
+      </p:pic>
+      <p:pic>
+        <p:nvPicPr>
+          <p:cNvPr id="14" name="Imagem 13"/>
+          <p:cNvPicPr>
+            <a:picLocks noChangeAspect="1"/>
+          </p:cNvPicPr>
+          <p:nvPr/>
+        </p:nvPicPr>
+        <p:blipFill>
+          <a:blip r:embed="rId3">
+            <a:extLst>
+              <a:ext uri="{28A0092B-C50C-407E-A947-70E740481C1C}">
+                <a14:useLocalDpi xmlns:a14="http://schemas.microsoft.com/office/drawing/2010/main" val="0"/>
+              </a:ext>
+            </a:extLst>
+          </a:blip>
+          <a:stretch>
+            <a:fillRect/>
+          </a:stretch>
+        </p:blipFill>
+        <p:spPr>
+          <a:xfrm>
+            <a:off x="6156960" y="2406694"/>
+            <a:ext cx="4815840" cy="1815808"/>
+          </a:xfrm>
+          <a:prstGeom prst="rect">
+            <a:avLst/>
+          </a:prstGeom>
         </p:spPr>
       </p:pic>
     </p:spTree>
     <p:extLst>
       <p:ext uri="{BB962C8B-B14F-4D97-AF65-F5344CB8AC3E}">
-        <p14:creationId xmlns:p14="http://schemas.microsoft.com/office/powerpoint/2010/main" val="4204111139"/>
+        <p14:creationId xmlns:p14="http://schemas.microsoft.com/office/powerpoint/2010/main" val="4122009148"/>
       </p:ext>
     </p:extLst>
   </p:cSld>

</xml_diff>